<commit_message>
new version of my part of presentation
</commit_message>
<xml_diff>
--- a/presentation_franzi.pptx
+++ b/presentation_franzi.pptx
@@ -4092,11 +4092,7 @@
           <a:p>
             <a:r>
               <a:rPr lang="de-DE" dirty="0" smtClean="0"/>
-              <a:t>XForms </a:t>
-            </a:r>
-            <a:r>
-              <a:rPr lang="de-DE" dirty="0" smtClean="0"/>
-              <a:t>Datenmodell Login</a:t>
+              <a:t>XForms Datenmodell Login</a:t>
             </a:r>
             <a:endParaRPr lang="de-DE" dirty="0"/>
           </a:p>
@@ -4133,14 +4129,14 @@
           <p:nvPr>
             <p:extLst>
               <p:ext uri="{D42A27DB-BD31-4B8C-83A1-F6EECF244321}">
-                <p14:modId xmlns:p14="http://schemas.microsoft.com/office/powerpoint/2010/main" val="3425039328"/>
+                <p14:modId xmlns:p14="http://schemas.microsoft.com/office/powerpoint/2010/main" val="1665002720"/>
               </p:ext>
             </p:extLst>
           </p:nvPr>
         </p:nvGraphicFramePr>
         <p:xfrm>
-          <a:off x="676656" y="1991360"/>
-          <a:ext cx="4238244" cy="2758440"/>
+          <a:off x="1244599" y="2515552"/>
+          <a:ext cx="3015421" cy="2758440"/>
         </p:xfrm>
         <a:graphic>
           <a:graphicData uri="http://schemas.openxmlformats.org/drawingml/2006/table">
@@ -4149,7 +4145,7 @@
                 <a:tableStyleId>{69012ECD-51FC-41F1-AA8D-1B2483CD663E}</a:tableStyleId>
               </a:tblPr>
               <a:tblGrid>
-                <a:gridCol w="4238244"/>
+                <a:gridCol w="3015421"/>
               </a:tblGrid>
               <a:tr h="985157">
                 <a:tc>
@@ -4294,6 +4290,254 @@
           </a:graphicData>
         </a:graphic>
       </p:graphicFrame>
+      <p:sp>
+        <p:nvSpPr>
+          <p:cNvPr id="5" name="Rechteck 4"/>
+          <p:cNvSpPr/>
+          <p:nvPr/>
+        </p:nvSpPr>
+        <p:spPr>
+          <a:xfrm>
+            <a:off x="657848" y="1749425"/>
+            <a:ext cx="4968252" cy="4775200"/>
+          </a:xfrm>
+          <a:prstGeom prst="rect">
+            <a:avLst/>
+          </a:prstGeom>
+          <a:noFill/>
+          <a:ln w="19050">
+            <a:solidFill>
+              <a:schemeClr val="accent1"/>
+            </a:solidFill>
+          </a:ln>
+        </p:spPr>
+        <p:style>
+          <a:lnRef idx="2">
+            <a:schemeClr val="accent1">
+              <a:shade val="50000"/>
+            </a:schemeClr>
+          </a:lnRef>
+          <a:fillRef idx="1">
+            <a:schemeClr val="accent1"/>
+          </a:fillRef>
+          <a:effectRef idx="0">
+            <a:schemeClr val="accent1"/>
+          </a:effectRef>
+          <a:fontRef idx="minor">
+            <a:schemeClr val="lt1"/>
+          </a:fontRef>
+        </p:style>
+        <p:txBody>
+          <a:bodyPr rtlCol="0" anchor="t"/>
+          <a:lstStyle/>
+          <a:p>
+            <a:pPr algn="ctr"/>
+            <a:r>
+              <a:rPr lang="de-DE" sz="2400" dirty="0" smtClean="0">
+                <a:solidFill>
+                  <a:schemeClr val="tx1"/>
+                </a:solidFill>
+              </a:rPr>
+              <a:t>login.xml</a:t>
+            </a:r>
+            <a:endParaRPr lang="de-DE" sz="2400" dirty="0">
+              <a:solidFill>
+                <a:schemeClr val="tx1"/>
+              </a:solidFill>
+            </a:endParaRPr>
+          </a:p>
+        </p:txBody>
+      </p:sp>
+      <p:sp>
+        <p:nvSpPr>
+          <p:cNvPr id="6" name="Rechteck 5"/>
+          <p:cNvSpPr/>
+          <p:nvPr/>
+        </p:nvSpPr>
+        <p:spPr>
+          <a:xfrm>
+            <a:off x="6043611" y="1749425"/>
+            <a:ext cx="5181598" cy="4775200"/>
+          </a:xfrm>
+          <a:prstGeom prst="rect">
+            <a:avLst/>
+          </a:prstGeom>
+          <a:noFill/>
+          <a:ln w="19050">
+            <a:solidFill>
+              <a:schemeClr val="accent1"/>
+            </a:solidFill>
+          </a:ln>
+        </p:spPr>
+        <p:style>
+          <a:lnRef idx="2">
+            <a:schemeClr val="accent1">
+              <a:shade val="50000"/>
+            </a:schemeClr>
+          </a:lnRef>
+          <a:fillRef idx="1">
+            <a:schemeClr val="accent1"/>
+          </a:fillRef>
+          <a:effectRef idx="0">
+            <a:schemeClr val="accent1"/>
+          </a:effectRef>
+          <a:fontRef idx="minor">
+            <a:schemeClr val="lt1"/>
+          </a:fontRef>
+        </p:style>
+        <p:txBody>
+          <a:bodyPr rtlCol="0" anchor="t"/>
+          <a:lstStyle/>
+          <a:p>
+            <a:pPr algn="ctr"/>
+            <a:r>
+              <a:rPr lang="de-DE" sz="2400" dirty="0" err="1" smtClean="0">
+                <a:solidFill>
+                  <a:schemeClr val="tx1"/>
+                </a:solidFill>
+              </a:rPr>
+              <a:t>controller.xqm</a:t>
+            </a:r>
+            <a:endParaRPr lang="de-DE" sz="2400" dirty="0">
+              <a:solidFill>
+                <a:schemeClr val="tx1"/>
+              </a:solidFill>
+            </a:endParaRPr>
+          </a:p>
+        </p:txBody>
+      </p:sp>
+      <p:cxnSp>
+        <p:nvCxnSpPr>
+          <p:cNvPr id="7" name="Gerade Verbindung mit Pfeil 6"/>
+          <p:cNvCxnSpPr>
+            <a:stCxn id="9" idx="3"/>
+            <a:endCxn id="8" idx="1"/>
+          </p:cNvCxnSpPr>
+          <p:nvPr/>
+        </p:nvCxnSpPr>
+        <p:spPr>
+          <a:xfrm>
+            <a:off x="4260020" y="3894772"/>
+            <a:ext cx="2828518" cy="0"/>
+          </a:xfrm>
+          <a:prstGeom prst="straightConnector1">
+            <a:avLst/>
+          </a:prstGeom>
+          <a:ln>
+            <a:tailEnd type="triangle"/>
+          </a:ln>
+        </p:spPr>
+        <p:style>
+          <a:lnRef idx="1">
+            <a:schemeClr val="accent1"/>
+          </a:lnRef>
+          <a:fillRef idx="0">
+            <a:schemeClr val="accent1"/>
+          </a:fillRef>
+          <a:effectRef idx="0">
+            <a:schemeClr val="accent1"/>
+          </a:effectRef>
+          <a:fontRef idx="minor">
+            <a:schemeClr val="tx1"/>
+          </a:fontRef>
+        </p:style>
+      </p:cxnSp>
+      <p:sp>
+        <p:nvSpPr>
+          <p:cNvPr id="8" name="Rechteck 7"/>
+          <p:cNvSpPr/>
+          <p:nvPr/>
+        </p:nvSpPr>
+        <p:spPr>
+          <a:xfrm>
+            <a:off x="7088538" y="2958826"/>
+            <a:ext cx="3091743" cy="1871892"/>
+          </a:xfrm>
+          <a:prstGeom prst="rect">
+            <a:avLst/>
+          </a:prstGeom>
+          <a:noFill/>
+          <a:ln w="19050">
+            <a:solidFill>
+              <a:schemeClr val="accent1"/>
+            </a:solidFill>
+          </a:ln>
+        </p:spPr>
+        <p:style>
+          <a:lnRef idx="2">
+            <a:schemeClr val="accent1">
+              <a:shade val="50000"/>
+            </a:schemeClr>
+          </a:lnRef>
+          <a:fillRef idx="1">
+            <a:schemeClr val="accent1"/>
+          </a:fillRef>
+          <a:effectRef idx="0">
+            <a:schemeClr val="accent1"/>
+          </a:effectRef>
+          <a:fontRef idx="minor">
+            <a:schemeClr val="lt1"/>
+          </a:fontRef>
+        </p:style>
+        <p:txBody>
+          <a:bodyPr rtlCol="0" anchor="t"/>
+          <a:lstStyle/>
+          <a:p>
+            <a:pPr algn="ctr"/>
+            <a:r>
+              <a:rPr lang="de-DE" sz="2400" dirty="0" err="1" smtClean="0">
+                <a:solidFill>
+                  <a:schemeClr val="tx1"/>
+                </a:solidFill>
+              </a:rPr>
+              <a:t>lobby</a:t>
+            </a:r>
+            <a:r>
+              <a:rPr lang="de-DE" sz="2400" dirty="0" smtClean="0">
+                <a:solidFill>
+                  <a:schemeClr val="tx1"/>
+                </a:solidFill>
+              </a:rPr>
+              <a:t>()</a:t>
+            </a:r>
+            <a:endParaRPr lang="de-DE" sz="2400" dirty="0">
+              <a:solidFill>
+                <a:schemeClr val="tx1"/>
+              </a:solidFill>
+            </a:endParaRPr>
+          </a:p>
+        </p:txBody>
+      </p:sp>
+      <p:sp>
+        <p:nvSpPr>
+          <p:cNvPr id="10" name="Textfeld 9"/>
+          <p:cNvSpPr txBox="1"/>
+          <p:nvPr/>
+        </p:nvSpPr>
+        <p:spPr>
+          <a:xfrm>
+            <a:off x="4465193" y="3407623"/>
+            <a:ext cx="1549400" cy="461665"/>
+          </a:xfrm>
+          <a:prstGeom prst="rect">
+            <a:avLst/>
+          </a:prstGeom>
+          <a:noFill/>
+        </p:spPr>
+        <p:txBody>
+          <a:bodyPr wrap="square" rtlCol="0">
+            <a:spAutoFit/>
+          </a:bodyPr>
+          <a:lstStyle/>
+          <a:p>
+            <a:r>
+              <a:rPr lang="de-DE" sz="2400" dirty="0" err="1" smtClean="0"/>
+              <a:t>RestXQ</a:t>
+            </a:r>
+            <a:endParaRPr lang="de-DE" sz="2400" dirty="0"/>
+          </a:p>
+        </p:txBody>
+      </p:sp>
     </p:spTree>
     <p:extLst>
       <p:ext uri="{BB962C8B-B14F-4D97-AF65-F5344CB8AC3E}">
@@ -5204,8 +5448,8 @@
         </p:nvSpPr>
         <p:spPr>
           <a:xfrm>
-            <a:off x="4427954" y="2221910"/>
-            <a:ext cx="6887746" cy="4210597"/>
+            <a:off x="4427954" y="2400300"/>
+            <a:ext cx="6887746" cy="4032207"/>
           </a:xfrm>
           <a:prstGeom prst="rect">
             <a:avLst/>
@@ -5393,34 +5637,8 @@
           <a:p>
             <a:r>
               <a:rPr lang="de-DE" dirty="0" smtClean="0"/>
-              <a:t>XForms </a:t>
-            </a:r>
-            <a:r>
-              <a:rPr lang="de-DE" dirty="0" smtClean="0"/>
-              <a:t>Datenmodell Lobby</a:t>
-            </a:r>
-            <a:endParaRPr lang="de-DE" dirty="0"/>
-          </a:p>
-        </p:txBody>
-      </p:sp>
-      <p:sp>
-        <p:nvSpPr>
-          <p:cNvPr id="3" name="Inhaltsplatzhalter 2"/>
-          <p:cNvSpPr>
-            <a:spLocks noGrp="1"/>
-          </p:cNvSpPr>
-          <p:nvPr>
-            <p:ph idx="1"/>
-          </p:nvPr>
-        </p:nvSpPr>
-        <p:spPr/>
-        <p:txBody>
-          <a:bodyPr/>
-          <a:lstStyle/>
-          <a:p>
-            <a:endParaRPr lang="de-DE" dirty="0"/>
-          </a:p>
-          <a:p>
+              <a:t>XForms Datenmodell Lobby</a:t>
+            </a:r>
             <a:endParaRPr lang="de-DE" dirty="0"/>
           </a:p>
         </p:txBody>
@@ -5434,7 +5652,7 @@
           <p:nvPr>
             <p:extLst>
               <p:ext uri="{D42A27DB-BD31-4B8C-83A1-F6EECF244321}">
-                <p14:modId xmlns:p14="http://schemas.microsoft.com/office/powerpoint/2010/main" val="753784392"/>
+                <p14:modId xmlns:p14="http://schemas.microsoft.com/office/powerpoint/2010/main" val="3722793569"/>
               </p:ext>
             </p:extLst>
           </p:nvPr>
@@ -5637,17 +5855,12 @@
                       </a:r>
                       <a:r>
                         <a:rPr lang="de-DE" sz="2800" dirty="0" err="1" smtClean="0"/>
-                        <a:t>HighScoreList</a:t>
+                        <a:t>SavedGamesList</a:t>
                       </a:r>
                       <a:r>
                         <a:rPr lang="de-DE" sz="2800" dirty="0" smtClean="0"/>
                         <a:t>()</a:t>
                       </a:r>
-                      <a:endParaRPr lang="de-DE" sz="2800" dirty="0" smtClean="0">
-                        <a:solidFill>
-                          <a:srgbClr val="FF0000"/>
-                        </a:solidFill>
-                      </a:endParaRPr>
                     </a:p>
                     <a:p>
                       <a:pPr marL="0" indent="0">
@@ -5655,16 +5868,12 @@
                         <a:buNone/>
                       </a:pPr>
                       <a:r>
-                        <a:rPr lang="de-DE" sz="2800" baseline="0" dirty="0" smtClean="0">
-                          <a:solidFill>
-                            <a:srgbClr val="FF0000"/>
-                          </a:solidFill>
-                        </a:rPr>
+                        <a:rPr lang="de-DE" sz="2800" dirty="0" smtClean="0"/>
                         <a:t>      </a:t>
                       </a:r>
                       <a:r>
                         <a:rPr lang="de-DE" sz="2800" dirty="0" err="1" smtClean="0"/>
-                        <a:t>SavedGamesList</a:t>
+                        <a:t>HighScoreList</a:t>
                       </a:r>
                       <a:r>
                         <a:rPr lang="de-DE" sz="2800" dirty="0" smtClean="0"/>

</xml_diff>